<commit_message>
Clean up full-stack-asset-trasfer-guide docs
Remove old repository (hyperledgendary) link from readme diagram.

Signed-off-by: Marcus Brandenburger <bur@zurich.ibm.com>
</commit_message>
<xml_diff>
--- a/full-stack-asset-transfer-guide/docs/images/CloudReady.pptx
+++ b/full-stack-asset-transfer-guide/docs/images/CloudReady.pptx
@@ -266,7 +266,7 @@
           <a:p>
             <a:fld id="{FEDF1FBF-B18C-8A46-83FA-737EDAEFA390}" type="datetimeFigureOut">
               <a:rPr lang="en-US"/>
-              <a:t>9/11/22</a:t>
+              <a:t>12/14/22</a:t>
             </a:fld>
             <a:endParaRPr lang="en-US"/>
           </a:p>
@@ -464,7 +464,7 @@
           <a:p>
             <a:fld id="{FEDF1FBF-B18C-8A46-83FA-737EDAEFA390}" type="datetimeFigureOut">
               <a:rPr lang="en-US"/>
-              <a:t>9/11/22</a:t>
+              <a:t>12/14/22</a:t>
             </a:fld>
             <a:endParaRPr lang="en-US"/>
           </a:p>
@@ -672,7 +672,7 @@
           <a:p>
             <a:fld id="{FEDF1FBF-B18C-8A46-83FA-737EDAEFA390}" type="datetimeFigureOut">
               <a:rPr lang="en-US"/>
-              <a:t>9/11/22</a:t>
+              <a:t>12/14/22</a:t>
             </a:fld>
             <a:endParaRPr lang="en-US"/>
           </a:p>
@@ -870,7 +870,7 @@
           <a:p>
             <a:fld id="{FEDF1FBF-B18C-8A46-83FA-737EDAEFA390}" type="datetimeFigureOut">
               <a:rPr lang="en-US"/>
-              <a:t>9/11/22</a:t>
+              <a:t>12/14/22</a:t>
             </a:fld>
             <a:endParaRPr lang="en-US"/>
           </a:p>
@@ -1145,7 +1145,7 @@
           <a:p>
             <a:fld id="{FEDF1FBF-B18C-8A46-83FA-737EDAEFA390}" type="datetimeFigureOut">
               <a:rPr lang="en-US"/>
-              <a:t>9/11/22</a:t>
+              <a:t>12/14/22</a:t>
             </a:fld>
             <a:endParaRPr lang="en-US"/>
           </a:p>
@@ -1410,7 +1410,7 @@
           <a:p>
             <a:fld id="{FEDF1FBF-B18C-8A46-83FA-737EDAEFA390}" type="datetimeFigureOut">
               <a:rPr lang="en-US"/>
-              <a:t>9/11/22</a:t>
+              <a:t>12/14/22</a:t>
             </a:fld>
             <a:endParaRPr lang="en-US"/>
           </a:p>
@@ -1822,7 +1822,7 @@
           <a:p>
             <a:fld id="{FEDF1FBF-B18C-8A46-83FA-737EDAEFA390}" type="datetimeFigureOut">
               <a:rPr lang="en-US"/>
-              <a:t>9/11/22</a:t>
+              <a:t>12/14/22</a:t>
             </a:fld>
             <a:endParaRPr lang="en-US"/>
           </a:p>
@@ -1963,7 +1963,7 @@
           <a:p>
             <a:fld id="{FEDF1FBF-B18C-8A46-83FA-737EDAEFA390}" type="datetimeFigureOut">
               <a:rPr lang="en-US"/>
-              <a:t>9/11/22</a:t>
+              <a:t>12/14/22</a:t>
             </a:fld>
             <a:endParaRPr lang="en-US"/>
           </a:p>
@@ -2076,7 +2076,7 @@
           <a:p>
             <a:fld id="{FEDF1FBF-B18C-8A46-83FA-737EDAEFA390}" type="datetimeFigureOut">
               <a:rPr lang="en-US"/>
-              <a:t>9/11/22</a:t>
+              <a:t>12/14/22</a:t>
             </a:fld>
             <a:endParaRPr lang="en-US"/>
           </a:p>
@@ -2387,7 +2387,7 @@
           <a:p>
             <a:fld id="{FEDF1FBF-B18C-8A46-83FA-737EDAEFA390}" type="datetimeFigureOut">
               <a:rPr lang="en-US"/>
-              <a:t>9/11/22</a:t>
+              <a:t>12/14/22</a:t>
             </a:fld>
             <a:endParaRPr lang="en-US"/>
           </a:p>
@@ -2675,7 +2675,7 @@
           <a:p>
             <a:fld id="{FEDF1FBF-B18C-8A46-83FA-737EDAEFA390}" type="datetimeFigureOut">
               <a:rPr lang="en-US"/>
-              <a:t>9/11/22</a:t>
+              <a:t>12/14/22</a:t>
             </a:fld>
             <a:endParaRPr lang="en-US"/>
           </a:p>
@@ -2916,7 +2916,7 @@
           <a:p>
             <a:fld id="{FEDF1FBF-B18C-8A46-83FA-737EDAEFA390}" type="datetimeFigureOut">
               <a:rPr lang="en-US"/>
-              <a:t>9/11/22</a:t>
+              <a:t>12/14/22</a:t>
             </a:fld>
             <a:endParaRPr lang="en-US"/>
           </a:p>
@@ -4566,44 +4566,6 @@
           </a:p>
         </p:txBody>
       </p:sp>
-      <p:sp>
-        <p:nvSpPr>
-          <p:cNvPr id="46" name="TextBox 45">
-            <a:extLst>
-              <a:ext uri="{FF2B5EF4-FFF2-40B4-BE49-F238E27FC236}">
-                <a16:creationId xmlns:a16="http://schemas.microsoft.com/office/drawing/2014/main" id="{9DA0E3A6-F094-196B-78E3-A0F57B263AEF}"/>
-              </a:ext>
-            </a:extLst>
-          </p:cNvPr>
-          <p:cNvSpPr txBox="1"/>
-          <p:nvPr/>
-        </p:nvSpPr>
-        <p:spPr>
-          <a:xfrm>
-            <a:off x="2332796" y="36421"/>
-            <a:ext cx="7526408" cy="400110"/>
-          </a:xfrm>
-          <a:prstGeom prst="rect">
-            <a:avLst/>
-          </a:prstGeom>
-          <a:noFill/>
-        </p:spPr>
-        <p:txBody>
-          <a:bodyPr wrap="square">
-            <a:spAutoFit/>
-          </a:bodyPr>
-          <a:lstStyle/>
-          <a:p>
-            <a:r>
-              <a:rPr lang="en-US" sz="2000">
-                <a:hlinkClick r:id="rId2"/>
-              </a:rPr>
-              <a:t>https://github.com/hyperledgendary/full-stack-asset-transfer-guide</a:t>
-            </a:r>
-            <a:endParaRPr lang="en-US" sz="2000"/>
-          </a:p>
-        </p:txBody>
-      </p:sp>
       <p:cxnSp>
         <p:nvCxnSpPr>
           <p:cNvPr id="48" name="Straight Connector 47">

</xml_diff>